<commit_message>
Adds Chapter-6 content, adds images
</commit_message>
<xml_diff>
--- a/resources/Book-Images.pptx
+++ b/resources/Book-Images.pptx
@@ -243,7 +243,7 @@
           <a:p>
             <a:fld id="{78F2F26C-9256-4E49-822A-CBF31DCDB915}" type="datetimeFigureOut">
               <a:rPr lang="en-US" smtClean="0"/>
-              <a:t>07-Mar-17</a:t>
+              <a:t>3/7/2017</a:t>
             </a:fld>
             <a:endParaRPr lang="en-US"/>
           </a:p>
@@ -411,7 +411,7 @@
           <a:p>
             <a:fld id="{78F2F26C-9256-4E49-822A-CBF31DCDB915}" type="datetimeFigureOut">
               <a:rPr lang="en-US" smtClean="0"/>
-              <a:t>07-Mar-17</a:t>
+              <a:t>3/7/2017</a:t>
             </a:fld>
             <a:endParaRPr lang="en-US"/>
           </a:p>
@@ -589,7 +589,7 @@
           <a:p>
             <a:fld id="{78F2F26C-9256-4E49-822A-CBF31DCDB915}" type="datetimeFigureOut">
               <a:rPr lang="en-US" smtClean="0"/>
-              <a:t>07-Mar-17</a:t>
+              <a:t>3/7/2017</a:t>
             </a:fld>
             <a:endParaRPr lang="en-US"/>
           </a:p>
@@ -757,7 +757,7 @@
           <a:p>
             <a:fld id="{78F2F26C-9256-4E49-822A-CBF31DCDB915}" type="datetimeFigureOut">
               <a:rPr lang="en-US" smtClean="0"/>
-              <a:t>07-Mar-17</a:t>
+              <a:t>3/7/2017</a:t>
             </a:fld>
             <a:endParaRPr lang="en-US"/>
           </a:p>
@@ -1002,7 +1002,7 @@
           <a:p>
             <a:fld id="{78F2F26C-9256-4E49-822A-CBF31DCDB915}" type="datetimeFigureOut">
               <a:rPr lang="en-US" smtClean="0"/>
-              <a:t>07-Mar-17</a:t>
+              <a:t>3/7/2017</a:t>
             </a:fld>
             <a:endParaRPr lang="en-US"/>
           </a:p>
@@ -1231,7 +1231,7 @@
           <a:p>
             <a:fld id="{78F2F26C-9256-4E49-822A-CBF31DCDB915}" type="datetimeFigureOut">
               <a:rPr lang="en-US" smtClean="0"/>
-              <a:t>07-Mar-17</a:t>
+              <a:t>3/7/2017</a:t>
             </a:fld>
             <a:endParaRPr lang="en-US"/>
           </a:p>
@@ -1595,7 +1595,7 @@
           <a:p>
             <a:fld id="{78F2F26C-9256-4E49-822A-CBF31DCDB915}" type="datetimeFigureOut">
               <a:rPr lang="en-US" smtClean="0"/>
-              <a:t>07-Mar-17</a:t>
+              <a:t>3/7/2017</a:t>
             </a:fld>
             <a:endParaRPr lang="en-US"/>
           </a:p>
@@ -1712,7 +1712,7 @@
           <a:p>
             <a:fld id="{78F2F26C-9256-4E49-822A-CBF31DCDB915}" type="datetimeFigureOut">
               <a:rPr lang="en-US" smtClean="0"/>
-              <a:t>07-Mar-17</a:t>
+              <a:t>3/7/2017</a:t>
             </a:fld>
             <a:endParaRPr lang="en-US"/>
           </a:p>
@@ -1807,7 +1807,7 @@
           <a:p>
             <a:fld id="{78F2F26C-9256-4E49-822A-CBF31DCDB915}" type="datetimeFigureOut">
               <a:rPr lang="en-US" smtClean="0"/>
-              <a:t>07-Mar-17</a:t>
+              <a:t>3/7/2017</a:t>
             </a:fld>
             <a:endParaRPr lang="en-US"/>
           </a:p>
@@ -2082,7 +2082,7 @@
           <a:p>
             <a:fld id="{78F2F26C-9256-4E49-822A-CBF31DCDB915}" type="datetimeFigureOut">
               <a:rPr lang="en-US" smtClean="0"/>
-              <a:t>07-Mar-17</a:t>
+              <a:t>3/7/2017</a:t>
             </a:fld>
             <a:endParaRPr lang="en-US"/>
           </a:p>
@@ -2334,7 +2334,7 @@
           <a:p>
             <a:fld id="{78F2F26C-9256-4E49-822A-CBF31DCDB915}" type="datetimeFigureOut">
               <a:rPr lang="en-US" smtClean="0"/>
-              <a:t>07-Mar-17</a:t>
+              <a:t>3/7/2017</a:t>
             </a:fld>
             <a:endParaRPr lang="en-US"/>
           </a:p>
@@ -2545,7 +2545,7 @@
           <a:p>
             <a:fld id="{78F2F26C-9256-4E49-822A-CBF31DCDB915}" type="datetimeFigureOut">
               <a:rPr lang="en-US" smtClean="0"/>
-              <a:t>07-Mar-17</a:t>
+              <a:t>3/7/2017</a:t>
             </a:fld>
             <a:endParaRPr lang="en-US"/>
           </a:p>

</xml_diff>